<commit_message>
Add societal primary studies to the geoparsed results
</commit_message>
<xml_diff>
--- a/data/geoparsing/geoparsing_cleaning_steps.pptx
+++ b/data/geoparsing/geoparsing_cleaning_steps.pptx
@@ -6,6 +6,7 @@
   </p:sldMasterIdLst>
   <p:sldIdLst>
     <p:sldId id="256" r:id="rId2"/>
+    <p:sldId id="257" r:id="rId3"/>
   </p:sldIdLst>
   <p:sldSz cx="6858000" cy="12192000"/>
   <p:notesSz cx="6858000" cy="9144000"/>
@@ -243,7 +244,7 @@
           <a:p>
             <a:fld id="{A6812E6F-E69F-42A0-B23F-CA470F6B2C34}" type="datetimeFigureOut">
               <a:rPr lang="en-GB" smtClean="0"/>
-              <a:t>28/02/2024</a:t>
+              <a:t>10/04/2024</a:t>
             </a:fld>
             <a:endParaRPr lang="en-GB"/>
           </a:p>
@@ -413,7 +414,7 @@
           <a:p>
             <a:fld id="{A6812E6F-E69F-42A0-B23F-CA470F6B2C34}" type="datetimeFigureOut">
               <a:rPr lang="en-GB" smtClean="0"/>
-              <a:t>28/02/2024</a:t>
+              <a:t>10/04/2024</a:t>
             </a:fld>
             <a:endParaRPr lang="en-GB"/>
           </a:p>
@@ -593,7 +594,7 @@
           <a:p>
             <a:fld id="{A6812E6F-E69F-42A0-B23F-CA470F6B2C34}" type="datetimeFigureOut">
               <a:rPr lang="en-GB" smtClean="0"/>
-              <a:t>28/02/2024</a:t>
+              <a:t>10/04/2024</a:t>
             </a:fld>
             <a:endParaRPr lang="en-GB"/>
           </a:p>
@@ -763,7 +764,7 @@
           <a:p>
             <a:fld id="{A6812E6F-E69F-42A0-B23F-CA470F6B2C34}" type="datetimeFigureOut">
               <a:rPr lang="en-GB" smtClean="0"/>
-              <a:t>28/02/2024</a:t>
+              <a:t>10/04/2024</a:t>
             </a:fld>
             <a:endParaRPr lang="en-GB"/>
           </a:p>
@@ -1007,7 +1008,7 @@
           <a:p>
             <a:fld id="{A6812E6F-E69F-42A0-B23F-CA470F6B2C34}" type="datetimeFigureOut">
               <a:rPr lang="en-GB" smtClean="0"/>
-              <a:t>28/02/2024</a:t>
+              <a:t>10/04/2024</a:t>
             </a:fld>
             <a:endParaRPr lang="en-GB"/>
           </a:p>
@@ -1239,7 +1240,7 @@
           <a:p>
             <a:fld id="{A6812E6F-E69F-42A0-B23F-CA470F6B2C34}" type="datetimeFigureOut">
               <a:rPr lang="en-GB" smtClean="0"/>
-              <a:t>28/02/2024</a:t>
+              <a:t>10/04/2024</a:t>
             </a:fld>
             <a:endParaRPr lang="en-GB"/>
           </a:p>
@@ -1606,7 +1607,7 @@
           <a:p>
             <a:fld id="{A6812E6F-E69F-42A0-B23F-CA470F6B2C34}" type="datetimeFigureOut">
               <a:rPr lang="en-GB" smtClean="0"/>
-              <a:t>28/02/2024</a:t>
+              <a:t>10/04/2024</a:t>
             </a:fld>
             <a:endParaRPr lang="en-GB"/>
           </a:p>
@@ -1724,7 +1725,7 @@
           <a:p>
             <a:fld id="{A6812E6F-E69F-42A0-B23F-CA470F6B2C34}" type="datetimeFigureOut">
               <a:rPr lang="en-GB" smtClean="0"/>
-              <a:t>28/02/2024</a:t>
+              <a:t>10/04/2024</a:t>
             </a:fld>
             <a:endParaRPr lang="en-GB"/>
           </a:p>
@@ -1819,7 +1820,7 @@
           <a:p>
             <a:fld id="{A6812E6F-E69F-42A0-B23F-CA470F6B2C34}" type="datetimeFigureOut">
               <a:rPr lang="en-GB" smtClean="0"/>
-              <a:t>28/02/2024</a:t>
+              <a:t>10/04/2024</a:t>
             </a:fld>
             <a:endParaRPr lang="en-GB"/>
           </a:p>
@@ -2096,7 +2097,7 @@
           <a:p>
             <a:fld id="{A6812E6F-E69F-42A0-B23F-CA470F6B2C34}" type="datetimeFigureOut">
               <a:rPr lang="en-GB" smtClean="0"/>
-              <a:t>28/02/2024</a:t>
+              <a:t>10/04/2024</a:t>
             </a:fld>
             <a:endParaRPr lang="en-GB"/>
           </a:p>
@@ -2353,7 +2354,7 @@
           <a:p>
             <a:fld id="{A6812E6F-E69F-42A0-B23F-CA470F6B2C34}" type="datetimeFigureOut">
               <a:rPr lang="en-GB" smtClean="0"/>
-              <a:t>28/02/2024</a:t>
+              <a:t>10/04/2024</a:t>
             </a:fld>
             <a:endParaRPr lang="en-GB"/>
           </a:p>
@@ -2566,7 +2567,7 @@
           <a:p>
             <a:fld id="{A6812E6F-E69F-42A0-B23F-CA470F6B2C34}" type="datetimeFigureOut">
               <a:rPr lang="en-GB" smtClean="0"/>
-              <a:t>28/02/2024</a:t>
+              <a:t>10/04/2024</a:t>
             </a:fld>
             <a:endParaRPr lang="en-GB"/>
           </a:p>
@@ -4970,6 +4971,1871 @@
 </p:sld>
 </file>
 
+<file path=ppt/slides/slide2.xml><?xml version="1.0" encoding="utf-8"?>
+<p:sld xmlns:a="http://schemas.openxmlformats.org/drawingml/2006/main" xmlns:r="http://schemas.openxmlformats.org/officeDocument/2006/relationships" xmlns:p="http://schemas.openxmlformats.org/presentationml/2006/main">
+  <p:cSld>
+    <p:spTree>
+      <p:nvGrpSpPr>
+        <p:cNvPr id="1" name=""/>
+        <p:cNvGrpSpPr/>
+        <p:nvPr/>
+      </p:nvGrpSpPr>
+      <p:grpSpPr>
+        <a:xfrm>
+          <a:off x="0" y="0"/>
+          <a:ext cx="0" cy="0"/>
+          <a:chOff x="0" y="0"/>
+          <a:chExt cx="0" cy="0"/>
+        </a:xfrm>
+      </p:grpSpPr>
+      <p:sp>
+        <p:nvSpPr>
+          <p:cNvPr id="5" name="ZoneTexte 4">
+            <a:extLst>
+              <a:ext uri="{FF2B5EF4-FFF2-40B4-BE49-F238E27FC236}">
+                <a16:creationId xmlns:a16="http://schemas.microsoft.com/office/drawing/2014/main" id="{F154F3A5-6815-4FB6-BE69-3C5036377A9A}"/>
+              </a:ext>
+            </a:extLst>
+          </p:cNvPr>
+          <p:cNvSpPr txBox="1"/>
+          <p:nvPr/>
+        </p:nvSpPr>
+        <p:spPr>
+          <a:xfrm>
+            <a:off x="1707343" y="300433"/>
+            <a:ext cx="1652154" cy="676923"/>
+          </a:xfrm>
+          <a:prstGeom prst="roundRect">
+            <a:avLst/>
+          </a:prstGeom>
+          <a:noFill/>
+          <a:ln>
+            <a:solidFill>
+              <a:schemeClr val="tx1"/>
+            </a:solidFill>
+          </a:ln>
+        </p:spPr>
+        <p:txBody>
+          <a:bodyPr wrap="square" rtlCol="0">
+            <a:spAutoFit/>
+          </a:bodyPr>
+          <a:lstStyle/>
+          <a:p>
+            <a:pPr algn="ctr"/>
+            <a:r>
+              <a:rPr lang="en-GB" sz="1350" b="1" dirty="0"/>
+              <a:t>All geoparsed data</a:t>
+            </a:r>
+          </a:p>
+          <a:p>
+            <a:pPr algn="ctr"/>
+            <a:r>
+              <a:rPr lang="en-GB" sz="1013" dirty="0"/>
+              <a:t>N row = 57,411</a:t>
+            </a:r>
+          </a:p>
+          <a:p>
+            <a:pPr algn="ctr"/>
+            <a:r>
+              <a:rPr lang="en-GB" sz="1013" dirty="0"/>
+              <a:t>N papers = 22,086  </a:t>
+            </a:r>
+          </a:p>
+        </p:txBody>
+      </p:sp>
+      <p:sp>
+        <p:nvSpPr>
+          <p:cNvPr id="6" name="ZoneTexte 5">
+            <a:extLst>
+              <a:ext uri="{FF2B5EF4-FFF2-40B4-BE49-F238E27FC236}">
+                <a16:creationId xmlns:a16="http://schemas.microsoft.com/office/drawing/2014/main" id="{1392A5F9-4C6D-4A85-B9F7-00053C0D4695}"/>
+              </a:ext>
+            </a:extLst>
+          </p:cNvPr>
+          <p:cNvSpPr txBox="1"/>
+          <p:nvPr/>
+        </p:nvSpPr>
+        <p:spPr>
+          <a:xfrm>
+            <a:off x="1707343" y="1222626"/>
+            <a:ext cx="1652154" cy="676923"/>
+          </a:xfrm>
+          <a:prstGeom prst="roundRect">
+            <a:avLst/>
+          </a:prstGeom>
+          <a:noFill/>
+          <a:ln>
+            <a:solidFill>
+              <a:schemeClr val="tx1"/>
+            </a:solidFill>
+          </a:ln>
+        </p:spPr>
+        <p:txBody>
+          <a:bodyPr wrap="square" rtlCol="0">
+            <a:spAutoFit/>
+          </a:bodyPr>
+          <a:lstStyle/>
+          <a:p>
+            <a:pPr algn="ctr"/>
+            <a:r>
+              <a:rPr lang="en-GB" sz="1350" b="1" dirty="0"/>
+              <a:t>geoP data empirical</a:t>
+            </a:r>
+          </a:p>
+          <a:p>
+            <a:pPr algn="ctr"/>
+            <a:r>
+              <a:rPr lang="en-GB" sz="1013" dirty="0"/>
+              <a:t>N row = 16,853</a:t>
+            </a:r>
+          </a:p>
+          <a:p>
+            <a:pPr algn="ctr"/>
+            <a:r>
+              <a:rPr lang="en-GB" sz="1013" dirty="0"/>
+              <a:t>N papers = 6530  </a:t>
+            </a:r>
+          </a:p>
+        </p:txBody>
+      </p:sp>
+      <p:cxnSp>
+        <p:nvCxnSpPr>
+          <p:cNvPr id="8" name="Connecteur droit avec flèche 7">
+            <a:extLst>
+              <a:ext uri="{FF2B5EF4-FFF2-40B4-BE49-F238E27FC236}">
+                <a16:creationId xmlns:a16="http://schemas.microsoft.com/office/drawing/2014/main" id="{EEA4D95E-9F63-479A-80A4-ADBB84EA59F3}"/>
+              </a:ext>
+            </a:extLst>
+          </p:cNvPr>
+          <p:cNvCxnSpPr>
+            <a:stCxn id="5" idx="2"/>
+            <a:endCxn id="6" idx="0"/>
+          </p:cNvCxnSpPr>
+          <p:nvPr/>
+        </p:nvCxnSpPr>
+        <p:spPr>
+          <a:xfrm>
+            <a:off x="2533420" y="977356"/>
+            <a:ext cx="0" cy="245270"/>
+          </a:xfrm>
+          <a:prstGeom prst="straightConnector1">
+            <a:avLst/>
+          </a:prstGeom>
+          <a:ln w="28575">
+            <a:solidFill>
+              <a:schemeClr val="tx1"/>
+            </a:solidFill>
+            <a:tailEnd type="triangle"/>
+          </a:ln>
+        </p:spPr>
+        <p:style>
+          <a:lnRef idx="1">
+            <a:schemeClr val="accent1"/>
+          </a:lnRef>
+          <a:fillRef idx="0">
+            <a:schemeClr val="accent1"/>
+          </a:fillRef>
+          <a:effectRef idx="0">
+            <a:schemeClr val="accent1"/>
+          </a:effectRef>
+          <a:fontRef idx="minor">
+            <a:schemeClr val="tx1"/>
+          </a:fontRef>
+        </p:style>
+      </p:cxnSp>
+      <p:sp>
+        <p:nvSpPr>
+          <p:cNvPr id="10" name="ZoneTexte 9">
+            <a:extLst>
+              <a:ext uri="{FF2B5EF4-FFF2-40B4-BE49-F238E27FC236}">
+                <a16:creationId xmlns:a16="http://schemas.microsoft.com/office/drawing/2014/main" id="{B9210855-48A1-49BD-BEF3-2B951CE170B5}"/>
+              </a:ext>
+            </a:extLst>
+          </p:cNvPr>
+          <p:cNvSpPr txBox="1"/>
+          <p:nvPr/>
+        </p:nvSpPr>
+        <p:spPr>
+          <a:xfrm>
+            <a:off x="2530265" y="961773"/>
+            <a:ext cx="3114955" cy="248209"/>
+          </a:xfrm>
+          <a:prstGeom prst="rect">
+            <a:avLst/>
+          </a:prstGeom>
+          <a:noFill/>
+        </p:spPr>
+        <p:txBody>
+          <a:bodyPr wrap="none" rtlCol="0">
+            <a:spAutoFit/>
+          </a:bodyPr>
+          <a:lstStyle/>
+          <a:p>
+            <a:r>
+              <a:rPr lang="en-GB" sz="1013" dirty="0"/>
+              <a:t>Filter 0: Select only empirical and social primary studies</a:t>
+            </a:r>
+          </a:p>
+        </p:txBody>
+      </p:sp>
+      <p:sp>
+        <p:nvSpPr>
+          <p:cNvPr id="12" name="ZoneTexte 11">
+            <a:extLst>
+              <a:ext uri="{FF2B5EF4-FFF2-40B4-BE49-F238E27FC236}">
+                <a16:creationId xmlns:a16="http://schemas.microsoft.com/office/drawing/2014/main" id="{0FFF69A5-7A47-4464-A340-1F8BC089C473}"/>
+              </a:ext>
+            </a:extLst>
+          </p:cNvPr>
+          <p:cNvSpPr txBox="1"/>
+          <p:nvPr/>
+        </p:nvSpPr>
+        <p:spPr>
+          <a:xfrm>
+            <a:off x="4108393" y="1395084"/>
+            <a:ext cx="1652154" cy="332006"/>
+          </a:xfrm>
+          <a:prstGeom prst="roundRect">
+            <a:avLst/>
+          </a:prstGeom>
+          <a:pattFill prst="lgGrid">
+            <a:fgClr>
+              <a:schemeClr val="bg1">
+                <a:lumMod val="65000"/>
+              </a:schemeClr>
+            </a:fgClr>
+            <a:bgClr>
+              <a:schemeClr val="bg1"/>
+            </a:bgClr>
+          </a:pattFill>
+          <a:ln>
+            <a:solidFill>
+              <a:schemeClr val="tx1"/>
+            </a:solidFill>
+          </a:ln>
+        </p:spPr>
+        <p:txBody>
+          <a:bodyPr wrap="square" rtlCol="0">
+            <a:spAutoFit/>
+          </a:bodyPr>
+          <a:lstStyle/>
+          <a:p>
+            <a:pPr algn="ctr"/>
+            <a:r>
+              <a:rPr lang="en-GB" sz="1350" b="1" dirty="0"/>
+              <a:t>Grid of cell matches</a:t>
+            </a:r>
+          </a:p>
+        </p:txBody>
+      </p:sp>
+      <p:sp>
+        <p:nvSpPr>
+          <p:cNvPr id="16" name="ZoneTexte 15">
+            <a:extLst>
+              <a:ext uri="{FF2B5EF4-FFF2-40B4-BE49-F238E27FC236}">
+                <a16:creationId xmlns:a16="http://schemas.microsoft.com/office/drawing/2014/main" id="{39573503-0535-4AAB-A4BD-BAEF1F995E37}"/>
+              </a:ext>
+            </a:extLst>
+          </p:cNvPr>
+          <p:cNvSpPr txBox="1"/>
+          <p:nvPr/>
+        </p:nvSpPr>
+        <p:spPr>
+          <a:xfrm>
+            <a:off x="2616345" y="2429299"/>
+            <a:ext cx="2199785" cy="676923"/>
+          </a:xfrm>
+          <a:prstGeom prst="roundRect">
+            <a:avLst/>
+          </a:prstGeom>
+          <a:noFill/>
+          <a:ln>
+            <a:solidFill>
+              <a:schemeClr val="tx1"/>
+            </a:solidFill>
+          </a:ln>
+        </p:spPr>
+        <p:txBody>
+          <a:bodyPr wrap="square" rtlCol="0">
+            <a:spAutoFit/>
+          </a:bodyPr>
+          <a:lstStyle/>
+          <a:p>
+            <a:pPr algn="ctr"/>
+            <a:r>
+              <a:rPr lang="en-GB" sz="1350" b="1" dirty="0"/>
+              <a:t>geoP data empirical cell</a:t>
+            </a:r>
+          </a:p>
+          <a:p>
+            <a:pPr algn="ctr"/>
+            <a:r>
+              <a:rPr lang="en-GB" sz="1013" dirty="0"/>
+              <a:t>N row = 1,107,767</a:t>
+            </a:r>
+          </a:p>
+          <a:p>
+            <a:pPr algn="ctr"/>
+            <a:r>
+              <a:rPr lang="en-GB" sz="1013" dirty="0"/>
+              <a:t>N papers = 6530</a:t>
+            </a:r>
+          </a:p>
+        </p:txBody>
+      </p:sp>
+      <p:grpSp>
+        <p:nvGrpSpPr>
+          <p:cNvPr id="20" name="Groupe 19">
+            <a:extLst>
+              <a:ext uri="{FF2B5EF4-FFF2-40B4-BE49-F238E27FC236}">
+                <a16:creationId xmlns:a16="http://schemas.microsoft.com/office/drawing/2014/main" id="{65C5773B-5155-4AAD-89C3-9EBC88785690}"/>
+              </a:ext>
+            </a:extLst>
+          </p:cNvPr>
+          <p:cNvGrpSpPr/>
+          <p:nvPr/>
+        </p:nvGrpSpPr>
+        <p:grpSpPr>
+          <a:xfrm>
+            <a:off x="3354562" y="1561087"/>
+            <a:ext cx="748896" cy="868212"/>
+            <a:chOff x="3359497" y="1561087"/>
+            <a:chExt cx="748896" cy="868212"/>
+          </a:xfrm>
+        </p:grpSpPr>
+        <p:cxnSp>
+          <p:nvCxnSpPr>
+            <p:cNvPr id="14" name="Connecteur droit 13">
+              <a:extLst>
+                <a:ext uri="{FF2B5EF4-FFF2-40B4-BE49-F238E27FC236}">
+                  <a16:creationId xmlns:a16="http://schemas.microsoft.com/office/drawing/2014/main" id="{722BCDBB-61C0-40D1-B645-3217EEB0C3AB}"/>
+                </a:ext>
+              </a:extLst>
+            </p:cNvPr>
+            <p:cNvCxnSpPr>
+              <a:stCxn id="6" idx="3"/>
+              <a:endCxn id="12" idx="1"/>
+            </p:cNvCxnSpPr>
+            <p:nvPr/>
+          </p:nvCxnSpPr>
+          <p:spPr>
+            <a:xfrm flipV="1">
+              <a:off x="3359497" y="1561087"/>
+              <a:ext cx="748896" cy="1"/>
+            </a:xfrm>
+            <a:prstGeom prst="line">
+              <a:avLst/>
+            </a:prstGeom>
+            <a:ln w="28575">
+              <a:solidFill>
+                <a:schemeClr val="tx1"/>
+              </a:solidFill>
+            </a:ln>
+          </p:spPr>
+          <p:style>
+            <a:lnRef idx="1">
+              <a:schemeClr val="accent1"/>
+            </a:lnRef>
+            <a:fillRef idx="0">
+              <a:schemeClr val="accent1"/>
+            </a:fillRef>
+            <a:effectRef idx="0">
+              <a:schemeClr val="accent1"/>
+            </a:effectRef>
+            <a:fontRef idx="minor">
+              <a:schemeClr val="tx1"/>
+            </a:fontRef>
+          </p:style>
+        </p:cxnSp>
+        <p:cxnSp>
+          <p:nvCxnSpPr>
+            <p:cNvPr id="18" name="Connecteur droit avec flèche 17">
+              <a:extLst>
+                <a:ext uri="{FF2B5EF4-FFF2-40B4-BE49-F238E27FC236}">
+                  <a16:creationId xmlns:a16="http://schemas.microsoft.com/office/drawing/2014/main" id="{CE3C02DF-5002-4843-A956-8D5CF1651E5A}"/>
+                </a:ext>
+              </a:extLst>
+            </p:cNvPr>
+            <p:cNvCxnSpPr>
+              <a:cxnSpLocks/>
+              <a:endCxn id="16" idx="0"/>
+            </p:cNvCxnSpPr>
+            <p:nvPr/>
+          </p:nvCxnSpPr>
+          <p:spPr>
+            <a:xfrm>
+              <a:off x="3721173" y="1561087"/>
+              <a:ext cx="0" cy="868212"/>
+            </a:xfrm>
+            <a:prstGeom prst="straightConnector1">
+              <a:avLst/>
+            </a:prstGeom>
+            <a:ln w="28575">
+              <a:solidFill>
+                <a:schemeClr val="tx1"/>
+              </a:solidFill>
+              <a:tailEnd type="triangle"/>
+            </a:ln>
+          </p:spPr>
+          <p:style>
+            <a:lnRef idx="1">
+              <a:schemeClr val="accent1"/>
+            </a:lnRef>
+            <a:fillRef idx="0">
+              <a:schemeClr val="accent1"/>
+            </a:fillRef>
+            <a:effectRef idx="0">
+              <a:schemeClr val="accent1"/>
+            </a:effectRef>
+            <a:fontRef idx="minor">
+              <a:schemeClr val="tx1"/>
+            </a:fontRef>
+          </p:style>
+        </p:cxnSp>
+      </p:grpSp>
+      <p:sp>
+        <p:nvSpPr>
+          <p:cNvPr id="42" name="ZoneTexte 41">
+            <a:extLst>
+              <a:ext uri="{FF2B5EF4-FFF2-40B4-BE49-F238E27FC236}">
+                <a16:creationId xmlns:a16="http://schemas.microsoft.com/office/drawing/2014/main" id="{2ED36305-A656-4018-B891-0A816A7D325A}"/>
+              </a:ext>
+            </a:extLst>
+          </p:cNvPr>
+          <p:cNvSpPr txBox="1"/>
+          <p:nvPr/>
+        </p:nvSpPr>
+        <p:spPr>
+          <a:xfrm>
+            <a:off x="290231" y="3446703"/>
+            <a:ext cx="2803743" cy="676923"/>
+          </a:xfrm>
+          <a:prstGeom prst="roundRect">
+            <a:avLst/>
+          </a:prstGeom>
+          <a:noFill/>
+          <a:ln>
+            <a:solidFill>
+              <a:schemeClr val="tx1"/>
+            </a:solidFill>
+          </a:ln>
+        </p:spPr>
+        <p:txBody>
+          <a:bodyPr wrap="square" rtlCol="0">
+            <a:spAutoFit/>
+          </a:bodyPr>
+          <a:lstStyle/>
+          <a:p>
+            <a:pPr algn="ctr"/>
+            <a:r>
+              <a:rPr lang="en-GB" sz="1350" b="1" dirty="0"/>
+              <a:t>geoP data empirical cell acronym</a:t>
+            </a:r>
+          </a:p>
+          <a:p>
+            <a:pPr algn="ctr"/>
+            <a:r>
+              <a:rPr lang="en-GB" sz="1013" dirty="0"/>
+              <a:t>N row = 1,094,923</a:t>
+            </a:r>
+          </a:p>
+          <a:p>
+            <a:pPr algn="ctr"/>
+            <a:r>
+              <a:rPr lang="en-GB" sz="1013" dirty="0"/>
+              <a:t>N papers = 6436 </a:t>
+            </a:r>
+          </a:p>
+        </p:txBody>
+      </p:sp>
+      <p:cxnSp>
+        <p:nvCxnSpPr>
+          <p:cNvPr id="43" name="Connecteur : en angle 42">
+            <a:extLst>
+              <a:ext uri="{FF2B5EF4-FFF2-40B4-BE49-F238E27FC236}">
+                <a16:creationId xmlns:a16="http://schemas.microsoft.com/office/drawing/2014/main" id="{DE1C4FC7-DA01-4144-9B0C-8E196E58772C}"/>
+              </a:ext>
+            </a:extLst>
+          </p:cNvPr>
+          <p:cNvCxnSpPr>
+            <a:cxnSpLocks/>
+            <a:stCxn id="16" idx="1"/>
+            <a:endCxn id="42" idx="0"/>
+          </p:cNvCxnSpPr>
+          <p:nvPr/>
+        </p:nvCxnSpPr>
+        <p:spPr>
+          <a:xfrm rot="10800000" flipV="1">
+            <a:off x="1692103" y="2767761"/>
+            <a:ext cx="924242" cy="678942"/>
+          </a:xfrm>
+          <a:prstGeom prst="bentConnector2">
+            <a:avLst/>
+          </a:prstGeom>
+          <a:ln w="28575">
+            <a:solidFill>
+              <a:schemeClr val="tx1"/>
+            </a:solidFill>
+            <a:tailEnd type="triangle"/>
+          </a:ln>
+        </p:spPr>
+        <p:style>
+          <a:lnRef idx="1">
+            <a:schemeClr val="accent1"/>
+          </a:lnRef>
+          <a:fillRef idx="0">
+            <a:schemeClr val="accent1"/>
+          </a:fillRef>
+          <a:effectRef idx="0">
+            <a:schemeClr val="accent1"/>
+          </a:effectRef>
+          <a:fontRef idx="minor">
+            <a:schemeClr val="tx1"/>
+          </a:fontRef>
+        </p:style>
+      </p:cxnSp>
+      <p:sp>
+        <p:nvSpPr>
+          <p:cNvPr id="49" name="ZoneTexte 48">
+            <a:extLst>
+              <a:ext uri="{FF2B5EF4-FFF2-40B4-BE49-F238E27FC236}">
+                <a16:creationId xmlns:a16="http://schemas.microsoft.com/office/drawing/2014/main" id="{E60285F9-8576-4502-A8A8-1E4DBAAB9547}"/>
+              </a:ext>
+            </a:extLst>
+          </p:cNvPr>
+          <p:cNvSpPr txBox="1"/>
+          <p:nvPr/>
+        </p:nvSpPr>
+        <p:spPr>
+          <a:xfrm>
+            <a:off x="-101320" y="2090838"/>
+            <a:ext cx="2631585" cy="715837"/>
+          </a:xfrm>
+          <a:prstGeom prst="rect">
+            <a:avLst/>
+          </a:prstGeom>
+          <a:noFill/>
+        </p:spPr>
+        <p:txBody>
+          <a:bodyPr wrap="square" rtlCol="0">
+            <a:spAutoFit/>
+          </a:bodyPr>
+          <a:lstStyle/>
+          <a:p>
+            <a:pPr algn="ctr"/>
+            <a:r>
+              <a:rPr lang="en-GB" sz="1013" dirty="0"/>
+              <a:t>Filter 1: </a:t>
+            </a:r>
+            <a:br>
+              <a:rPr lang="en-GB" sz="1013" dirty="0"/>
+            </a:br>
+            <a:r>
+              <a:rPr lang="en-US" sz="1013" dirty="0"/>
+              <a:t>(Filter row that are not in capital letter) OR      </a:t>
+            </a:r>
+            <a:br>
+              <a:rPr lang="en-US" sz="1013" dirty="0"/>
+            </a:br>
+            <a:r>
+              <a:rPr lang="en-US" sz="1013" dirty="0"/>
+              <a:t>(Filter row in capital letters &amp; nchar &gt; 3) OR </a:t>
+            </a:r>
+          </a:p>
+          <a:p>
+            <a:pPr algn="ctr"/>
+            <a:r>
+              <a:rPr lang="en-US" sz="1013" dirty="0"/>
+              <a:t>(Filter row in capital letters &amp; c(USA, UK or US)</a:t>
+            </a:r>
+            <a:endParaRPr lang="en-GB" sz="1013" dirty="0"/>
+          </a:p>
+        </p:txBody>
+      </p:sp>
+      <p:sp>
+        <p:nvSpPr>
+          <p:cNvPr id="53" name="ZoneTexte 52">
+            <a:extLst>
+              <a:ext uri="{FF2B5EF4-FFF2-40B4-BE49-F238E27FC236}">
+                <a16:creationId xmlns:a16="http://schemas.microsoft.com/office/drawing/2014/main" id="{2A2B27E3-BE65-494B-A633-42CE646778B1}"/>
+              </a:ext>
+            </a:extLst>
+          </p:cNvPr>
+          <p:cNvSpPr txBox="1"/>
+          <p:nvPr/>
+        </p:nvSpPr>
+        <p:spPr>
+          <a:xfrm>
+            <a:off x="290230" y="4656174"/>
+            <a:ext cx="2803743" cy="676923"/>
+          </a:xfrm>
+          <a:prstGeom prst="roundRect">
+            <a:avLst/>
+          </a:prstGeom>
+          <a:noFill/>
+          <a:ln>
+            <a:solidFill>
+              <a:schemeClr val="tx1"/>
+            </a:solidFill>
+          </a:ln>
+        </p:spPr>
+        <p:txBody>
+          <a:bodyPr wrap="square" rtlCol="0">
+            <a:spAutoFit/>
+          </a:bodyPr>
+          <a:lstStyle/>
+          <a:p>
+            <a:pPr algn="ctr"/>
+            <a:r>
+              <a:rPr lang="en-GB" sz="1350" b="1" dirty="0"/>
+              <a:t>geoP data empirical cell acronym ©</a:t>
+            </a:r>
+          </a:p>
+          <a:p>
+            <a:pPr algn="ctr"/>
+            <a:r>
+              <a:rPr lang="en-GB" sz="1013" dirty="0"/>
+              <a:t>N row = 1,080,904</a:t>
+            </a:r>
+          </a:p>
+          <a:p>
+            <a:pPr algn="ctr"/>
+            <a:r>
+              <a:rPr lang="en-GB" sz="1013" dirty="0"/>
+              <a:t>N papers = 6330</a:t>
+            </a:r>
+          </a:p>
+        </p:txBody>
+      </p:sp>
+      <p:cxnSp>
+        <p:nvCxnSpPr>
+          <p:cNvPr id="55" name="Connecteur droit avec flèche 54">
+            <a:extLst>
+              <a:ext uri="{FF2B5EF4-FFF2-40B4-BE49-F238E27FC236}">
+                <a16:creationId xmlns:a16="http://schemas.microsoft.com/office/drawing/2014/main" id="{47F99452-5703-4401-956A-43530DFE0796}"/>
+              </a:ext>
+            </a:extLst>
+          </p:cNvPr>
+          <p:cNvCxnSpPr>
+            <a:stCxn id="42" idx="2"/>
+            <a:endCxn id="53" idx="0"/>
+          </p:cNvCxnSpPr>
+          <p:nvPr/>
+        </p:nvCxnSpPr>
+        <p:spPr>
+          <a:xfrm flipH="1">
+            <a:off x="1692102" y="4123626"/>
+            <a:ext cx="1" cy="532548"/>
+          </a:xfrm>
+          <a:prstGeom prst="straightConnector1">
+            <a:avLst/>
+          </a:prstGeom>
+          <a:ln w="28575">
+            <a:solidFill>
+              <a:schemeClr val="tx1"/>
+            </a:solidFill>
+            <a:tailEnd type="triangle"/>
+          </a:ln>
+        </p:spPr>
+        <p:style>
+          <a:lnRef idx="1">
+            <a:schemeClr val="accent1"/>
+          </a:lnRef>
+          <a:fillRef idx="0">
+            <a:schemeClr val="accent1"/>
+          </a:fillRef>
+          <a:effectRef idx="0">
+            <a:schemeClr val="accent1"/>
+          </a:effectRef>
+          <a:fontRef idx="minor">
+            <a:schemeClr val="tx1"/>
+          </a:fontRef>
+        </p:style>
+      </p:cxnSp>
+      <p:sp>
+        <p:nvSpPr>
+          <p:cNvPr id="60" name="ZoneTexte 59">
+            <a:extLst>
+              <a:ext uri="{FF2B5EF4-FFF2-40B4-BE49-F238E27FC236}">
+                <a16:creationId xmlns:a16="http://schemas.microsoft.com/office/drawing/2014/main" id="{1F7C607B-8975-495C-9A44-E92F13F75681}"/>
+              </a:ext>
+            </a:extLst>
+          </p:cNvPr>
+          <p:cNvSpPr txBox="1"/>
+          <p:nvPr/>
+        </p:nvSpPr>
+        <p:spPr>
+          <a:xfrm>
+            <a:off x="1143280" y="4265795"/>
+            <a:ext cx="2631585" cy="248209"/>
+          </a:xfrm>
+          <a:prstGeom prst="rect">
+            <a:avLst/>
+          </a:prstGeom>
+          <a:noFill/>
+        </p:spPr>
+        <p:txBody>
+          <a:bodyPr wrap="square" rtlCol="0">
+            <a:spAutoFit/>
+          </a:bodyPr>
+          <a:lstStyle/>
+          <a:p>
+            <a:pPr algn="ctr"/>
+            <a:r>
+              <a:rPr lang="en-GB" sz="1013" dirty="0"/>
+              <a:t>Filter 2: </a:t>
+            </a:r>
+            <a:r>
+              <a:rPr lang="fr-FR" sz="1013" dirty="0"/>
+              <a:t>remove © issues</a:t>
+            </a:r>
+            <a:endParaRPr lang="en-GB" sz="1013" dirty="0"/>
+          </a:p>
+        </p:txBody>
+      </p:sp>
+      <p:sp>
+        <p:nvSpPr>
+          <p:cNvPr id="65" name="ZoneTexte 64">
+            <a:extLst>
+              <a:ext uri="{FF2B5EF4-FFF2-40B4-BE49-F238E27FC236}">
+                <a16:creationId xmlns:a16="http://schemas.microsoft.com/office/drawing/2014/main" id="{E043D4E7-CDDB-4D43-B4E5-984370410F28}"/>
+              </a:ext>
+            </a:extLst>
+          </p:cNvPr>
+          <p:cNvSpPr txBox="1"/>
+          <p:nvPr/>
+        </p:nvSpPr>
+        <p:spPr>
+          <a:xfrm>
+            <a:off x="290230" y="5856915"/>
+            <a:ext cx="2803743" cy="906773"/>
+          </a:xfrm>
+          <a:prstGeom prst="roundRect">
+            <a:avLst/>
+          </a:prstGeom>
+          <a:noFill/>
+          <a:ln>
+            <a:solidFill>
+              <a:schemeClr val="tx1"/>
+            </a:solidFill>
+          </a:ln>
+        </p:spPr>
+        <p:txBody>
+          <a:bodyPr wrap="square" rtlCol="0">
+            <a:spAutoFit/>
+          </a:bodyPr>
+          <a:lstStyle/>
+          <a:p>
+            <a:pPr algn="ctr"/>
+            <a:r>
+              <a:rPr lang="en-GB" sz="1350" b="1" dirty="0"/>
+              <a:t>geoP data empirical cell acronym © 200km</a:t>
+            </a:r>
+          </a:p>
+          <a:p>
+            <a:pPr algn="ctr"/>
+            <a:r>
+              <a:rPr lang="en-GB" sz="1013" dirty="0"/>
+              <a:t>N row = 398,605</a:t>
+            </a:r>
+          </a:p>
+          <a:p>
+            <a:pPr algn="ctr"/>
+            <a:r>
+              <a:rPr lang="en-GB" sz="1013" dirty="0"/>
+              <a:t>N papers = 5608  </a:t>
+            </a:r>
+          </a:p>
+        </p:txBody>
+      </p:sp>
+      <p:cxnSp>
+        <p:nvCxnSpPr>
+          <p:cNvPr id="66" name="Connecteur droit avec flèche 65">
+            <a:extLst>
+              <a:ext uri="{FF2B5EF4-FFF2-40B4-BE49-F238E27FC236}">
+                <a16:creationId xmlns:a16="http://schemas.microsoft.com/office/drawing/2014/main" id="{03F3DAA2-7BFC-48D0-9A63-C18CAB02CAD6}"/>
+              </a:ext>
+            </a:extLst>
+          </p:cNvPr>
+          <p:cNvCxnSpPr>
+            <a:endCxn id="65" idx="0"/>
+          </p:cNvCxnSpPr>
+          <p:nvPr/>
+        </p:nvCxnSpPr>
+        <p:spPr>
+          <a:xfrm flipH="1">
+            <a:off x="1692102" y="5324367"/>
+            <a:ext cx="2" cy="532548"/>
+          </a:xfrm>
+          <a:prstGeom prst="straightConnector1">
+            <a:avLst/>
+          </a:prstGeom>
+          <a:ln w="28575">
+            <a:solidFill>
+              <a:schemeClr val="tx1"/>
+            </a:solidFill>
+            <a:tailEnd type="triangle"/>
+          </a:ln>
+        </p:spPr>
+        <p:style>
+          <a:lnRef idx="1">
+            <a:schemeClr val="accent1"/>
+          </a:lnRef>
+          <a:fillRef idx="0">
+            <a:schemeClr val="accent1"/>
+          </a:fillRef>
+          <a:effectRef idx="0">
+            <a:schemeClr val="accent1"/>
+          </a:effectRef>
+          <a:fontRef idx="minor">
+            <a:schemeClr val="tx1"/>
+          </a:fontRef>
+        </p:style>
+      </p:cxnSp>
+      <p:sp>
+        <p:nvSpPr>
+          <p:cNvPr id="67" name="ZoneTexte 66">
+            <a:extLst>
+              <a:ext uri="{FF2B5EF4-FFF2-40B4-BE49-F238E27FC236}">
+                <a16:creationId xmlns:a16="http://schemas.microsoft.com/office/drawing/2014/main" id="{48CBBF3C-BC68-4D5E-95C7-922410E6FFA7}"/>
+              </a:ext>
+            </a:extLst>
+          </p:cNvPr>
+          <p:cNvSpPr txBox="1"/>
+          <p:nvPr/>
+        </p:nvSpPr>
+        <p:spPr>
+          <a:xfrm>
+            <a:off x="1692101" y="5397475"/>
+            <a:ext cx="2631585" cy="404085"/>
+          </a:xfrm>
+          <a:prstGeom prst="rect">
+            <a:avLst/>
+          </a:prstGeom>
+          <a:noFill/>
+        </p:spPr>
+        <p:txBody>
+          <a:bodyPr wrap="square" rtlCol="0">
+            <a:spAutoFit/>
+          </a:bodyPr>
+          <a:lstStyle/>
+          <a:p>
+            <a:pPr algn="ctr"/>
+            <a:r>
+              <a:rPr lang="en-GB" sz="1013" dirty="0"/>
+              <a:t>Filter 3: </a:t>
+            </a:r>
+            <a:r>
+              <a:rPr lang="en-US" sz="1013" dirty="0"/>
+              <a:t>select cells located more than 200 km from the coast</a:t>
+            </a:r>
+            <a:endParaRPr lang="en-GB" sz="1013" dirty="0"/>
+          </a:p>
+        </p:txBody>
+      </p:sp>
+      <p:sp>
+        <p:nvSpPr>
+          <p:cNvPr id="27" name="ZoneTexte 26">
+            <a:extLst>
+              <a:ext uri="{FF2B5EF4-FFF2-40B4-BE49-F238E27FC236}">
+                <a16:creationId xmlns:a16="http://schemas.microsoft.com/office/drawing/2014/main" id="{E02A2E62-008F-4CC7-B5FA-491236C67979}"/>
+              </a:ext>
+            </a:extLst>
+          </p:cNvPr>
+          <p:cNvSpPr txBox="1"/>
+          <p:nvPr/>
+        </p:nvSpPr>
+        <p:spPr>
+          <a:xfrm>
+            <a:off x="290230" y="7296597"/>
+            <a:ext cx="2803743" cy="906773"/>
+          </a:xfrm>
+          <a:prstGeom prst="roundRect">
+            <a:avLst/>
+          </a:prstGeom>
+          <a:noFill/>
+          <a:ln>
+            <a:solidFill>
+              <a:schemeClr val="tx1"/>
+            </a:solidFill>
+          </a:ln>
+        </p:spPr>
+        <p:txBody>
+          <a:bodyPr wrap="square" rtlCol="0">
+            <a:spAutoFit/>
+          </a:bodyPr>
+          <a:lstStyle/>
+          <a:p>
+            <a:pPr algn="ctr"/>
+            <a:r>
+              <a:rPr lang="en-GB" sz="1350" b="1" dirty="0"/>
+              <a:t>geoP data empirical cell acronym © 200km Q95% word</a:t>
+            </a:r>
+          </a:p>
+          <a:p>
+            <a:pPr algn="ctr"/>
+            <a:r>
+              <a:rPr lang="en-GB" sz="1013" dirty="0"/>
+              <a:t>N row = 379,630</a:t>
+            </a:r>
+          </a:p>
+          <a:p>
+            <a:pPr algn="ctr"/>
+            <a:r>
+              <a:rPr lang="en-GB" sz="1013" dirty="0"/>
+              <a:t>N papers = 5503 </a:t>
+            </a:r>
+          </a:p>
+        </p:txBody>
+      </p:sp>
+      <p:sp>
+        <p:nvSpPr>
+          <p:cNvPr id="29" name="ZoneTexte 28">
+            <a:extLst>
+              <a:ext uri="{FF2B5EF4-FFF2-40B4-BE49-F238E27FC236}">
+                <a16:creationId xmlns:a16="http://schemas.microsoft.com/office/drawing/2014/main" id="{67C0BDC6-6482-4723-A5C9-3634041216EC}"/>
+              </a:ext>
+            </a:extLst>
+          </p:cNvPr>
+          <p:cNvSpPr txBox="1"/>
+          <p:nvPr/>
+        </p:nvSpPr>
+        <p:spPr>
+          <a:xfrm>
+            <a:off x="3266131" y="7423262"/>
+            <a:ext cx="2631585" cy="559961"/>
+          </a:xfrm>
+          <a:prstGeom prst="rect">
+            <a:avLst/>
+          </a:prstGeom>
+          <a:noFill/>
+        </p:spPr>
+        <p:txBody>
+          <a:bodyPr wrap="square" rtlCol="0">
+            <a:spAutoFit/>
+          </a:bodyPr>
+          <a:lstStyle/>
+          <a:p>
+            <a:pPr algn="ctr"/>
+            <a:r>
+              <a:rPr lang="en-GB" sz="1013" dirty="0"/>
+              <a:t>Filter 5: </a:t>
+            </a:r>
+            <a:r>
+              <a:rPr lang="en-US" sz="1013" dirty="0"/>
+              <a:t>remove words that are in the English </a:t>
+            </a:r>
+            <a:br>
+              <a:rPr lang="en-US" sz="1013" dirty="0"/>
+            </a:br>
+            <a:r>
+              <a:rPr lang="en-US" sz="1013" dirty="0"/>
+              <a:t>dictionary but that are not a city, country or US States</a:t>
+            </a:r>
+            <a:endParaRPr lang="en-GB" sz="1013" dirty="0"/>
+          </a:p>
+        </p:txBody>
+      </p:sp>
+      <p:sp>
+        <p:nvSpPr>
+          <p:cNvPr id="31" name="ZoneTexte 30">
+            <a:extLst>
+              <a:ext uri="{FF2B5EF4-FFF2-40B4-BE49-F238E27FC236}">
+                <a16:creationId xmlns:a16="http://schemas.microsoft.com/office/drawing/2014/main" id="{7F3A33E1-B8AF-409C-98DA-9F0E3D27B00B}"/>
+              </a:ext>
+            </a:extLst>
+          </p:cNvPr>
+          <p:cNvSpPr txBox="1"/>
+          <p:nvPr/>
+        </p:nvSpPr>
+        <p:spPr>
+          <a:xfrm>
+            <a:off x="290229" y="8735918"/>
+            <a:ext cx="2803743" cy="906773"/>
+          </a:xfrm>
+          <a:prstGeom prst="roundRect">
+            <a:avLst/>
+          </a:prstGeom>
+          <a:noFill/>
+          <a:ln>
+            <a:solidFill>
+              <a:schemeClr val="tx1"/>
+            </a:solidFill>
+          </a:ln>
+        </p:spPr>
+        <p:txBody>
+          <a:bodyPr wrap="square" rtlCol="0">
+            <a:spAutoFit/>
+          </a:bodyPr>
+          <a:lstStyle/>
+          <a:p>
+            <a:pPr algn="ctr"/>
+            <a:r>
+              <a:rPr lang="en-GB" sz="1350" b="1" dirty="0"/>
+              <a:t>geoP data empirical cell acronym © 200km Q95% word num</a:t>
+            </a:r>
+          </a:p>
+          <a:p>
+            <a:pPr algn="ctr"/>
+            <a:r>
+              <a:rPr lang="en-GB" sz="1013" dirty="0"/>
+              <a:t>N row = 359,798</a:t>
+            </a:r>
+          </a:p>
+          <a:p>
+            <a:pPr algn="ctr"/>
+            <a:r>
+              <a:rPr lang="en-GB" sz="1013" dirty="0"/>
+              <a:t>N papers = 5310 </a:t>
+            </a:r>
+          </a:p>
+        </p:txBody>
+      </p:sp>
+      <p:cxnSp>
+        <p:nvCxnSpPr>
+          <p:cNvPr id="33" name="Connecteur droit avec flèche 32">
+            <a:extLst>
+              <a:ext uri="{FF2B5EF4-FFF2-40B4-BE49-F238E27FC236}">
+                <a16:creationId xmlns:a16="http://schemas.microsoft.com/office/drawing/2014/main" id="{2EC41C8D-58CC-4F7D-B29E-4D730666D9EF}"/>
+              </a:ext>
+            </a:extLst>
+          </p:cNvPr>
+          <p:cNvCxnSpPr>
+            <a:endCxn id="31" idx="0"/>
+          </p:cNvCxnSpPr>
+          <p:nvPr/>
+        </p:nvCxnSpPr>
+        <p:spPr>
+          <a:xfrm flipH="1">
+            <a:off x="1692101" y="8203370"/>
+            <a:ext cx="2" cy="532548"/>
+          </a:xfrm>
+          <a:prstGeom prst="straightConnector1">
+            <a:avLst/>
+          </a:prstGeom>
+          <a:ln w="28575">
+            <a:solidFill>
+              <a:schemeClr val="tx1"/>
+            </a:solidFill>
+            <a:tailEnd type="triangle"/>
+          </a:ln>
+        </p:spPr>
+        <p:style>
+          <a:lnRef idx="1">
+            <a:schemeClr val="accent1"/>
+          </a:lnRef>
+          <a:fillRef idx="0">
+            <a:schemeClr val="accent1"/>
+          </a:fillRef>
+          <a:effectRef idx="0">
+            <a:schemeClr val="accent1"/>
+          </a:effectRef>
+          <a:fontRef idx="minor">
+            <a:schemeClr val="tx1"/>
+          </a:fontRef>
+        </p:style>
+      </p:cxnSp>
+      <p:sp>
+        <p:nvSpPr>
+          <p:cNvPr id="34" name="ZoneTexte 33">
+            <a:extLst>
+              <a:ext uri="{FF2B5EF4-FFF2-40B4-BE49-F238E27FC236}">
+                <a16:creationId xmlns:a16="http://schemas.microsoft.com/office/drawing/2014/main" id="{619EDB4A-926A-4325-935B-D7C1AC893765}"/>
+              </a:ext>
+            </a:extLst>
+          </p:cNvPr>
+          <p:cNvSpPr txBox="1"/>
+          <p:nvPr/>
+        </p:nvSpPr>
+        <p:spPr>
+          <a:xfrm>
+            <a:off x="1692100" y="8191134"/>
+            <a:ext cx="2228910" cy="559961"/>
+          </a:xfrm>
+          <a:prstGeom prst="rect">
+            <a:avLst/>
+          </a:prstGeom>
+          <a:noFill/>
+        </p:spPr>
+        <p:txBody>
+          <a:bodyPr wrap="square" rtlCol="0">
+            <a:spAutoFit/>
+          </a:bodyPr>
+          <a:lstStyle/>
+          <a:p>
+            <a:pPr algn="ctr"/>
+            <a:r>
+              <a:rPr lang="en-GB" sz="1013" dirty="0"/>
+              <a:t>Filter +1: </a:t>
+            </a:r>
+            <a:r>
+              <a:rPr lang="en-US" sz="1013" dirty="0"/>
+              <a:t>Remove word matches that contains a number or that looks like species scientific name or ecosystem</a:t>
+            </a:r>
+            <a:endParaRPr lang="en-GB" sz="1013" dirty="0"/>
+          </a:p>
+        </p:txBody>
+      </p:sp>
+      <p:sp>
+        <p:nvSpPr>
+          <p:cNvPr id="35" name="ZoneTexte 34">
+            <a:extLst>
+              <a:ext uri="{FF2B5EF4-FFF2-40B4-BE49-F238E27FC236}">
+                <a16:creationId xmlns:a16="http://schemas.microsoft.com/office/drawing/2014/main" id="{67A587C0-0F05-49B8-9EC8-93A2EE95C756}"/>
+              </a:ext>
+            </a:extLst>
+          </p:cNvPr>
+          <p:cNvSpPr txBox="1"/>
+          <p:nvPr/>
+        </p:nvSpPr>
+        <p:spPr>
+          <a:xfrm>
+            <a:off x="3921023" y="8735917"/>
+            <a:ext cx="2803743" cy="906773"/>
+          </a:xfrm>
+          <a:prstGeom prst="roundRect">
+            <a:avLst/>
+          </a:prstGeom>
+          <a:noFill/>
+          <a:ln>
+            <a:solidFill>
+              <a:schemeClr val="tx1"/>
+            </a:solidFill>
+          </a:ln>
+        </p:spPr>
+        <p:txBody>
+          <a:bodyPr wrap="square" rtlCol="0">
+            <a:spAutoFit/>
+          </a:bodyPr>
+          <a:lstStyle/>
+          <a:p>
+            <a:pPr algn="ctr"/>
+            <a:r>
+              <a:rPr lang="en-GB" sz="1350" b="1" dirty="0"/>
+              <a:t>geoP data empirical cell acronym © 200km Q95% word num sea</a:t>
+            </a:r>
+          </a:p>
+          <a:p>
+            <a:pPr algn="ctr"/>
+            <a:r>
+              <a:rPr lang="en-GB" sz="1013" dirty="0"/>
+              <a:t>N row = 342,213</a:t>
+            </a:r>
+          </a:p>
+          <a:p>
+            <a:pPr algn="ctr"/>
+            <a:r>
+              <a:rPr lang="en-GB" sz="1013" dirty="0"/>
+              <a:t>N papers = 5198</a:t>
+            </a:r>
+          </a:p>
+        </p:txBody>
+      </p:sp>
+      <p:cxnSp>
+        <p:nvCxnSpPr>
+          <p:cNvPr id="36" name="Connecteur droit avec flèche 35">
+            <a:extLst>
+              <a:ext uri="{FF2B5EF4-FFF2-40B4-BE49-F238E27FC236}">
+                <a16:creationId xmlns:a16="http://schemas.microsoft.com/office/drawing/2014/main" id="{28FE0307-E789-4E0F-A53D-E89CEE0205CD}"/>
+              </a:ext>
+            </a:extLst>
+          </p:cNvPr>
+          <p:cNvCxnSpPr>
+            <a:cxnSpLocks/>
+            <a:stCxn id="31" idx="3"/>
+            <a:endCxn id="35" idx="1"/>
+          </p:cNvCxnSpPr>
+          <p:nvPr/>
+        </p:nvCxnSpPr>
+        <p:spPr>
+          <a:xfrm flipV="1">
+            <a:off x="3093972" y="9189304"/>
+            <a:ext cx="827051" cy="1"/>
+          </a:xfrm>
+          <a:prstGeom prst="straightConnector1">
+            <a:avLst/>
+          </a:prstGeom>
+          <a:ln w="28575">
+            <a:solidFill>
+              <a:schemeClr val="tx1"/>
+            </a:solidFill>
+            <a:tailEnd type="triangle"/>
+          </a:ln>
+        </p:spPr>
+        <p:style>
+          <a:lnRef idx="1">
+            <a:schemeClr val="accent1"/>
+          </a:lnRef>
+          <a:fillRef idx="0">
+            <a:schemeClr val="accent1"/>
+          </a:fillRef>
+          <a:effectRef idx="0">
+            <a:schemeClr val="accent1"/>
+          </a:effectRef>
+          <a:fontRef idx="minor">
+            <a:schemeClr val="tx1"/>
+          </a:fontRef>
+        </p:style>
+      </p:cxnSp>
+      <p:sp>
+        <p:nvSpPr>
+          <p:cNvPr id="37" name="ZoneTexte 36">
+            <a:extLst>
+              <a:ext uri="{FF2B5EF4-FFF2-40B4-BE49-F238E27FC236}">
+                <a16:creationId xmlns:a16="http://schemas.microsoft.com/office/drawing/2014/main" id="{6C07D6E2-CEDF-41EE-99AE-EDDF11BEE8E3}"/>
+              </a:ext>
+            </a:extLst>
+          </p:cNvPr>
+          <p:cNvSpPr txBox="1"/>
+          <p:nvPr/>
+        </p:nvSpPr>
+        <p:spPr>
+          <a:xfrm>
+            <a:off x="4000582" y="8208126"/>
+            <a:ext cx="2803739" cy="559961"/>
+          </a:xfrm>
+          <a:prstGeom prst="rect">
+            <a:avLst/>
+          </a:prstGeom>
+          <a:noFill/>
+        </p:spPr>
+        <p:txBody>
+          <a:bodyPr wrap="square" rtlCol="0">
+            <a:spAutoFit/>
+          </a:bodyPr>
+          <a:lstStyle/>
+          <a:p>
+            <a:pPr algn="ctr"/>
+            <a:r>
+              <a:rPr lang="en-GB" sz="1013" dirty="0"/>
+              <a:t>Filter +2:</a:t>
+            </a:r>
+            <a:r>
+              <a:rPr lang="en-US" sz="1013" dirty="0"/>
+              <a:t> Remove rows when the grid cell falls in a country without border with the corresponding "word" when it is a sea or an ocean</a:t>
+            </a:r>
+            <a:endParaRPr lang="en-GB" sz="1013" dirty="0"/>
+          </a:p>
+        </p:txBody>
+      </p:sp>
+      <p:sp>
+        <p:nvSpPr>
+          <p:cNvPr id="38" name="ZoneTexte 37">
+            <a:extLst>
+              <a:ext uri="{FF2B5EF4-FFF2-40B4-BE49-F238E27FC236}">
+                <a16:creationId xmlns:a16="http://schemas.microsoft.com/office/drawing/2014/main" id="{1A400606-E862-4A53-BEEA-31D6384A6B9F}"/>
+              </a:ext>
+            </a:extLst>
+          </p:cNvPr>
+          <p:cNvSpPr txBox="1"/>
+          <p:nvPr/>
+        </p:nvSpPr>
+        <p:spPr>
+          <a:xfrm>
+            <a:off x="3921024" y="10177526"/>
+            <a:ext cx="2803743" cy="906773"/>
+          </a:xfrm>
+          <a:prstGeom prst="roundRect">
+            <a:avLst/>
+          </a:prstGeom>
+          <a:noFill/>
+          <a:ln>
+            <a:solidFill>
+              <a:schemeClr val="tx1"/>
+            </a:solidFill>
+          </a:ln>
+        </p:spPr>
+        <p:txBody>
+          <a:bodyPr wrap="square" rtlCol="0">
+            <a:spAutoFit/>
+          </a:bodyPr>
+          <a:lstStyle/>
+          <a:p>
+            <a:pPr algn="ctr"/>
+            <a:r>
+              <a:rPr lang="en-GB" sz="1350" b="1" dirty="0"/>
+              <a:t>geoP data empirical cell acronym © 200km Q95% word num sea title</a:t>
+            </a:r>
+          </a:p>
+          <a:p>
+            <a:pPr algn="ctr"/>
+            <a:r>
+              <a:rPr lang="en-GB" sz="1013" dirty="0"/>
+              <a:t>N row = 309,560</a:t>
+            </a:r>
+          </a:p>
+          <a:p>
+            <a:pPr algn="ctr"/>
+            <a:r>
+              <a:rPr lang="en-GB" sz="1013" dirty="0"/>
+              <a:t>N papers = 5198</a:t>
+            </a:r>
+          </a:p>
+        </p:txBody>
+      </p:sp>
+      <p:cxnSp>
+        <p:nvCxnSpPr>
+          <p:cNvPr id="39" name="Connecteur droit avec flèche 38">
+            <a:extLst>
+              <a:ext uri="{FF2B5EF4-FFF2-40B4-BE49-F238E27FC236}">
+                <a16:creationId xmlns:a16="http://schemas.microsoft.com/office/drawing/2014/main" id="{F263248E-0B87-4013-972C-FA3E642A5F14}"/>
+              </a:ext>
+            </a:extLst>
+          </p:cNvPr>
+          <p:cNvCxnSpPr>
+            <a:cxnSpLocks/>
+            <a:stCxn id="35" idx="2"/>
+            <a:endCxn id="38" idx="0"/>
+          </p:cNvCxnSpPr>
+          <p:nvPr/>
+        </p:nvCxnSpPr>
+        <p:spPr>
+          <a:xfrm>
+            <a:off x="5322895" y="9642690"/>
+            <a:ext cx="1" cy="534836"/>
+          </a:xfrm>
+          <a:prstGeom prst="straightConnector1">
+            <a:avLst/>
+          </a:prstGeom>
+          <a:ln w="28575">
+            <a:solidFill>
+              <a:schemeClr val="tx1"/>
+            </a:solidFill>
+            <a:tailEnd type="triangle"/>
+          </a:ln>
+        </p:spPr>
+        <p:style>
+          <a:lnRef idx="1">
+            <a:schemeClr val="accent1"/>
+          </a:lnRef>
+          <a:fillRef idx="0">
+            <a:schemeClr val="accent1"/>
+          </a:fillRef>
+          <a:effectRef idx="0">
+            <a:schemeClr val="accent1"/>
+          </a:effectRef>
+          <a:fontRef idx="minor">
+            <a:schemeClr val="tx1"/>
+          </a:fontRef>
+        </p:style>
+      </p:cxnSp>
+      <p:sp>
+        <p:nvSpPr>
+          <p:cNvPr id="40" name="ZoneTexte 39">
+            <a:extLst>
+              <a:ext uri="{FF2B5EF4-FFF2-40B4-BE49-F238E27FC236}">
+                <a16:creationId xmlns:a16="http://schemas.microsoft.com/office/drawing/2014/main" id="{B6DAF7A0-A179-4E45-B31F-2FB8EA1BBE01}"/>
+              </a:ext>
+            </a:extLst>
+          </p:cNvPr>
+          <p:cNvSpPr txBox="1"/>
+          <p:nvPr/>
+        </p:nvSpPr>
+        <p:spPr>
+          <a:xfrm>
+            <a:off x="2113088" y="9619436"/>
+            <a:ext cx="3130252" cy="559961"/>
+          </a:xfrm>
+          <a:prstGeom prst="rect">
+            <a:avLst/>
+          </a:prstGeom>
+          <a:noFill/>
+        </p:spPr>
+        <p:txBody>
+          <a:bodyPr wrap="square" rtlCol="0">
+            <a:spAutoFit/>
+          </a:bodyPr>
+          <a:lstStyle/>
+          <a:p>
+            <a:pPr algn="ctr"/>
+            <a:r>
+              <a:rPr lang="en-GB" sz="1013" dirty="0"/>
+              <a:t>Filter +3/+4:</a:t>
+            </a:r>
+            <a:r>
+              <a:rPr lang="en-US" sz="1013" dirty="0"/>
+              <a:t> For analysis_id with a country name in the title/keywords, keep only the country in the title/keywords (avoid scale mistakes and comparisons)</a:t>
+            </a:r>
+            <a:endParaRPr lang="en-GB" sz="1013" dirty="0"/>
+          </a:p>
+        </p:txBody>
+      </p:sp>
+      <p:sp>
+        <p:nvSpPr>
+          <p:cNvPr id="50" name="ZoneTexte 49">
+            <a:extLst>
+              <a:ext uri="{FF2B5EF4-FFF2-40B4-BE49-F238E27FC236}">
+                <a16:creationId xmlns:a16="http://schemas.microsoft.com/office/drawing/2014/main" id="{CF19DA70-A68E-4937-8CB8-1D7B3BB431F3}"/>
+              </a:ext>
+            </a:extLst>
+          </p:cNvPr>
+          <p:cNvSpPr txBox="1"/>
+          <p:nvPr/>
+        </p:nvSpPr>
+        <p:spPr>
+          <a:xfrm>
+            <a:off x="290228" y="10182500"/>
+            <a:ext cx="2803743" cy="906773"/>
+          </a:xfrm>
+          <a:prstGeom prst="roundRect">
+            <a:avLst/>
+          </a:prstGeom>
+          <a:noFill/>
+          <a:ln>
+            <a:solidFill>
+              <a:schemeClr val="tx1"/>
+            </a:solidFill>
+          </a:ln>
+        </p:spPr>
+        <p:txBody>
+          <a:bodyPr wrap="square" rtlCol="0">
+            <a:spAutoFit/>
+          </a:bodyPr>
+          <a:lstStyle/>
+          <a:p>
+            <a:pPr algn="ctr"/>
+            <a:r>
+              <a:rPr lang="en-GB" sz="1350" b="1" dirty="0"/>
+              <a:t>geoP data empirical cell acronym © 200km word num sea title KW</a:t>
+            </a:r>
+          </a:p>
+          <a:p>
+            <a:pPr algn="ctr"/>
+            <a:r>
+              <a:rPr lang="en-GB" sz="1013" dirty="0"/>
+              <a:t>N row = 262,910</a:t>
+            </a:r>
+          </a:p>
+          <a:p>
+            <a:pPr algn="ctr"/>
+            <a:r>
+              <a:rPr lang="en-GB" sz="1013" dirty="0"/>
+              <a:t>N papers = 5198</a:t>
+            </a:r>
+          </a:p>
+        </p:txBody>
+      </p:sp>
+      <p:cxnSp>
+        <p:nvCxnSpPr>
+          <p:cNvPr id="51" name="Connecteur droit avec flèche 50">
+            <a:extLst>
+              <a:ext uri="{FF2B5EF4-FFF2-40B4-BE49-F238E27FC236}">
+                <a16:creationId xmlns:a16="http://schemas.microsoft.com/office/drawing/2014/main" id="{89B65C34-8352-41A9-9228-7251AA9FE793}"/>
+              </a:ext>
+            </a:extLst>
+          </p:cNvPr>
+          <p:cNvCxnSpPr>
+            <a:cxnSpLocks/>
+            <a:stCxn id="38" idx="1"/>
+            <a:endCxn id="50" idx="3"/>
+          </p:cNvCxnSpPr>
+          <p:nvPr/>
+        </p:nvCxnSpPr>
+        <p:spPr>
+          <a:xfrm flipH="1">
+            <a:off x="3093971" y="10630913"/>
+            <a:ext cx="827053" cy="4974"/>
+          </a:xfrm>
+          <a:prstGeom prst="straightConnector1">
+            <a:avLst/>
+          </a:prstGeom>
+          <a:ln w="28575">
+            <a:solidFill>
+              <a:schemeClr val="tx1"/>
+            </a:solidFill>
+            <a:tailEnd type="triangle"/>
+          </a:ln>
+        </p:spPr>
+        <p:style>
+          <a:lnRef idx="1">
+            <a:schemeClr val="accent1"/>
+          </a:lnRef>
+          <a:fillRef idx="0">
+            <a:schemeClr val="accent1"/>
+          </a:fillRef>
+          <a:effectRef idx="0">
+            <a:schemeClr val="accent1"/>
+          </a:effectRef>
+          <a:fontRef idx="minor">
+            <a:schemeClr val="tx1"/>
+          </a:fontRef>
+        </p:style>
+      </p:cxnSp>
+      <p:cxnSp>
+        <p:nvCxnSpPr>
+          <p:cNvPr id="44" name="Connecteur droit avec flèche 43">
+            <a:extLst>
+              <a:ext uri="{FF2B5EF4-FFF2-40B4-BE49-F238E27FC236}">
+                <a16:creationId xmlns:a16="http://schemas.microsoft.com/office/drawing/2014/main" id="{84904F05-58FE-4600-BA30-7916BD1336A2}"/>
+              </a:ext>
+            </a:extLst>
+          </p:cNvPr>
+          <p:cNvCxnSpPr>
+            <a:cxnSpLocks/>
+            <a:stCxn id="65" idx="3"/>
+            <a:endCxn id="45" idx="1"/>
+          </p:cNvCxnSpPr>
+          <p:nvPr/>
+        </p:nvCxnSpPr>
+        <p:spPr>
+          <a:xfrm>
+            <a:off x="3093973" y="6310302"/>
+            <a:ext cx="827049" cy="624690"/>
+          </a:xfrm>
+          <a:prstGeom prst="straightConnector1">
+            <a:avLst/>
+          </a:prstGeom>
+          <a:ln w="28575">
+            <a:solidFill>
+              <a:schemeClr val="tx1"/>
+            </a:solidFill>
+            <a:tailEnd type="triangle"/>
+          </a:ln>
+        </p:spPr>
+        <p:style>
+          <a:lnRef idx="1">
+            <a:schemeClr val="accent1"/>
+          </a:lnRef>
+          <a:fillRef idx="0">
+            <a:schemeClr val="accent1"/>
+          </a:fillRef>
+          <a:effectRef idx="0">
+            <a:schemeClr val="accent1"/>
+          </a:effectRef>
+          <a:fontRef idx="minor">
+            <a:schemeClr val="tx1"/>
+          </a:fontRef>
+        </p:style>
+      </p:cxnSp>
+      <p:sp>
+        <p:nvSpPr>
+          <p:cNvPr id="45" name="ZoneTexte 44">
+            <a:extLst>
+              <a:ext uri="{FF2B5EF4-FFF2-40B4-BE49-F238E27FC236}">
+                <a16:creationId xmlns:a16="http://schemas.microsoft.com/office/drawing/2014/main" id="{BF6209DB-EA3D-427C-9DB5-88211459D9B6}"/>
+              </a:ext>
+            </a:extLst>
+          </p:cNvPr>
+          <p:cNvSpPr txBox="1"/>
+          <p:nvPr/>
+        </p:nvSpPr>
+        <p:spPr>
+          <a:xfrm>
+            <a:off x="3921022" y="6481605"/>
+            <a:ext cx="2803743" cy="906773"/>
+          </a:xfrm>
+          <a:prstGeom prst="roundRect">
+            <a:avLst/>
+          </a:prstGeom>
+          <a:noFill/>
+          <a:ln>
+            <a:solidFill>
+              <a:schemeClr val="tx1"/>
+            </a:solidFill>
+          </a:ln>
+        </p:spPr>
+        <p:txBody>
+          <a:bodyPr wrap="square" rtlCol="0">
+            <a:spAutoFit/>
+          </a:bodyPr>
+          <a:lstStyle/>
+          <a:p>
+            <a:pPr algn="ctr"/>
+            <a:r>
+              <a:rPr lang="en-GB" sz="1350" b="1" dirty="0"/>
+              <a:t>geoP data empirical cell acronym © 200km Q95% </a:t>
+            </a:r>
+          </a:p>
+          <a:p>
+            <a:pPr algn="ctr"/>
+            <a:r>
+              <a:rPr lang="en-GB" sz="1013" dirty="0"/>
+              <a:t>N row = 385,197</a:t>
+            </a:r>
+          </a:p>
+          <a:p>
+            <a:pPr algn="ctr"/>
+            <a:r>
+              <a:rPr lang="en-GB" sz="1013" dirty="0"/>
+              <a:t>N papers = 5551 </a:t>
+            </a:r>
+          </a:p>
+        </p:txBody>
+      </p:sp>
+      <p:cxnSp>
+        <p:nvCxnSpPr>
+          <p:cNvPr id="46" name="Connecteur droit avec flèche 45">
+            <a:extLst>
+              <a:ext uri="{FF2B5EF4-FFF2-40B4-BE49-F238E27FC236}">
+                <a16:creationId xmlns:a16="http://schemas.microsoft.com/office/drawing/2014/main" id="{C9F19686-84B1-4B57-9ADD-EA2C3B3F24D9}"/>
+              </a:ext>
+            </a:extLst>
+          </p:cNvPr>
+          <p:cNvCxnSpPr>
+            <a:cxnSpLocks/>
+            <a:stCxn id="45" idx="1"/>
+            <a:endCxn id="27" idx="3"/>
+          </p:cNvCxnSpPr>
+          <p:nvPr/>
+        </p:nvCxnSpPr>
+        <p:spPr>
+          <a:xfrm flipH="1">
+            <a:off x="3093973" y="6934992"/>
+            <a:ext cx="827049" cy="814992"/>
+          </a:xfrm>
+          <a:prstGeom prst="straightConnector1">
+            <a:avLst/>
+          </a:prstGeom>
+          <a:ln w="28575">
+            <a:solidFill>
+              <a:schemeClr val="tx1"/>
+            </a:solidFill>
+            <a:tailEnd type="triangle"/>
+          </a:ln>
+        </p:spPr>
+        <p:style>
+          <a:lnRef idx="1">
+            <a:schemeClr val="accent1"/>
+          </a:lnRef>
+          <a:fillRef idx="0">
+            <a:schemeClr val="accent1"/>
+          </a:fillRef>
+          <a:effectRef idx="0">
+            <a:schemeClr val="accent1"/>
+          </a:effectRef>
+          <a:fontRef idx="minor">
+            <a:schemeClr val="tx1"/>
+          </a:fontRef>
+        </p:style>
+      </p:cxnSp>
+      <p:sp>
+        <p:nvSpPr>
+          <p:cNvPr id="47" name="ZoneTexte 46">
+            <a:extLst>
+              <a:ext uri="{FF2B5EF4-FFF2-40B4-BE49-F238E27FC236}">
+                <a16:creationId xmlns:a16="http://schemas.microsoft.com/office/drawing/2014/main" id="{0409D3AF-E198-4E28-B5F1-C59E5120737C}"/>
+              </a:ext>
+            </a:extLst>
+          </p:cNvPr>
+          <p:cNvSpPr txBox="1"/>
+          <p:nvPr/>
+        </p:nvSpPr>
+        <p:spPr>
+          <a:xfrm>
+            <a:off x="3180051" y="6246881"/>
+            <a:ext cx="2803743" cy="248209"/>
+          </a:xfrm>
+          <a:prstGeom prst="rect">
+            <a:avLst/>
+          </a:prstGeom>
+          <a:noFill/>
+        </p:spPr>
+        <p:txBody>
+          <a:bodyPr wrap="square" rtlCol="0">
+            <a:spAutoFit/>
+          </a:bodyPr>
+          <a:lstStyle/>
+          <a:p>
+            <a:pPr algn="ctr"/>
+            <a:r>
+              <a:rPr lang="fr-FR" sz="1013" dirty="0" err="1"/>
+              <a:t>Filter</a:t>
+            </a:r>
+            <a:r>
+              <a:rPr lang="fr-FR" sz="1013" dirty="0"/>
+              <a:t> 0.bis: correct </a:t>
+            </a:r>
+            <a:r>
+              <a:rPr lang="fr-FR" sz="1013" dirty="0" err="1"/>
+              <a:t>wrong</a:t>
+            </a:r>
+            <a:r>
+              <a:rPr lang="fr-FR" sz="1013" dirty="0"/>
+              <a:t> association of </a:t>
+            </a:r>
+            <a:r>
+              <a:rPr lang="fr-FR" sz="1013" dirty="0" err="1"/>
+              <a:t>shp_id</a:t>
+            </a:r>
+            <a:r>
+              <a:rPr lang="fr-FR" sz="1013" dirty="0"/>
+              <a:t> </a:t>
+            </a:r>
+            <a:endParaRPr lang="en-GB" sz="1013" dirty="0"/>
+          </a:p>
+        </p:txBody>
+      </p:sp>
+      <p:sp>
+        <p:nvSpPr>
+          <p:cNvPr id="48" name="ZoneTexte 47">
+            <a:extLst>
+              <a:ext uri="{FF2B5EF4-FFF2-40B4-BE49-F238E27FC236}">
+                <a16:creationId xmlns:a16="http://schemas.microsoft.com/office/drawing/2014/main" id="{C3086EB4-2F69-4A09-8955-235B4C98C24F}"/>
+              </a:ext>
+            </a:extLst>
+          </p:cNvPr>
+          <p:cNvSpPr txBox="1"/>
+          <p:nvPr/>
+        </p:nvSpPr>
+        <p:spPr>
+          <a:xfrm>
+            <a:off x="2105625" y="11152805"/>
+            <a:ext cx="2803743" cy="906773"/>
+          </a:xfrm>
+          <a:prstGeom prst="roundRect">
+            <a:avLst/>
+          </a:prstGeom>
+          <a:noFill/>
+          <a:ln>
+            <a:solidFill>
+              <a:schemeClr val="tx1"/>
+            </a:solidFill>
+          </a:ln>
+        </p:spPr>
+        <p:txBody>
+          <a:bodyPr wrap="square" rtlCol="0">
+            <a:spAutoFit/>
+          </a:bodyPr>
+          <a:lstStyle/>
+          <a:p>
+            <a:pPr algn="ctr"/>
+            <a:r>
+              <a:rPr lang="en-GB" sz="1350" b="1" dirty="0"/>
+              <a:t>geoP data empirical cell acronym © 200km word num sea title KW</a:t>
+            </a:r>
+          </a:p>
+          <a:p>
+            <a:pPr algn="ctr"/>
+            <a:r>
+              <a:rPr lang="en-GB" sz="1013" dirty="0"/>
+              <a:t>N row = 261,957</a:t>
+            </a:r>
+          </a:p>
+          <a:p>
+            <a:pPr algn="ctr"/>
+            <a:r>
+              <a:rPr lang="en-GB" sz="1013" dirty="0"/>
+              <a:t>N papers = 5194</a:t>
+            </a:r>
+          </a:p>
+        </p:txBody>
+      </p:sp>
+      <p:cxnSp>
+        <p:nvCxnSpPr>
+          <p:cNvPr id="52" name="Connecteur droit avec flèche 51">
+            <a:extLst>
+              <a:ext uri="{FF2B5EF4-FFF2-40B4-BE49-F238E27FC236}">
+                <a16:creationId xmlns:a16="http://schemas.microsoft.com/office/drawing/2014/main" id="{A50F9E6C-FDA1-4D3F-8439-10F05A44F126}"/>
+              </a:ext>
+            </a:extLst>
+          </p:cNvPr>
+          <p:cNvCxnSpPr>
+            <a:cxnSpLocks/>
+            <a:stCxn id="50" idx="2"/>
+            <a:endCxn id="48" idx="1"/>
+          </p:cNvCxnSpPr>
+          <p:nvPr/>
+        </p:nvCxnSpPr>
+        <p:spPr>
+          <a:xfrm>
+            <a:off x="1692100" y="11089273"/>
+            <a:ext cx="413525" cy="516919"/>
+          </a:xfrm>
+          <a:prstGeom prst="straightConnector1">
+            <a:avLst/>
+          </a:prstGeom>
+          <a:ln w="28575">
+            <a:solidFill>
+              <a:schemeClr val="tx1"/>
+            </a:solidFill>
+            <a:tailEnd type="triangle"/>
+          </a:ln>
+        </p:spPr>
+        <p:style>
+          <a:lnRef idx="1">
+            <a:schemeClr val="accent1"/>
+          </a:lnRef>
+          <a:fillRef idx="0">
+            <a:schemeClr val="accent1"/>
+          </a:fillRef>
+          <a:effectRef idx="0">
+            <a:schemeClr val="accent1"/>
+          </a:effectRef>
+          <a:fontRef idx="minor">
+            <a:schemeClr val="tx1"/>
+          </a:fontRef>
+        </p:style>
+      </p:cxnSp>
+      <p:sp>
+        <p:nvSpPr>
+          <p:cNvPr id="54" name="ZoneTexte 53">
+            <a:extLst>
+              <a:ext uri="{FF2B5EF4-FFF2-40B4-BE49-F238E27FC236}">
+                <a16:creationId xmlns:a16="http://schemas.microsoft.com/office/drawing/2014/main" id="{DFDEE9D9-8FA8-4410-8D8D-1419E263D147}"/>
+              </a:ext>
+            </a:extLst>
+          </p:cNvPr>
+          <p:cNvSpPr txBox="1"/>
+          <p:nvPr/>
+        </p:nvSpPr>
+        <p:spPr>
+          <a:xfrm>
+            <a:off x="-421846" y="11269280"/>
+            <a:ext cx="3130252" cy="248209"/>
+          </a:xfrm>
+          <a:prstGeom prst="rect">
+            <a:avLst/>
+          </a:prstGeom>
+          <a:noFill/>
+        </p:spPr>
+        <p:txBody>
+          <a:bodyPr wrap="square" rtlCol="0">
+            <a:spAutoFit/>
+          </a:bodyPr>
+          <a:lstStyle/>
+          <a:p>
+            <a:pPr algn="ctr"/>
+            <a:r>
+              <a:rPr lang="fr-FR" sz="1013" dirty="0"/>
+              <a:t>Last </a:t>
+            </a:r>
+            <a:r>
+              <a:rPr lang="fr-FR" sz="1013" dirty="0" err="1"/>
+              <a:t>filter</a:t>
+            </a:r>
+            <a:r>
+              <a:rPr lang="fr-FR" sz="1013" dirty="0"/>
+              <a:t>: </a:t>
+            </a:r>
+            <a:r>
+              <a:rPr lang="fr-FR" sz="1013" dirty="0" err="1"/>
+              <a:t>remove</a:t>
+            </a:r>
+            <a:r>
+              <a:rPr lang="fr-FR" sz="1013" dirty="0"/>
+              <a:t> HS </a:t>
+            </a:r>
+            <a:r>
+              <a:rPr lang="fr-FR" sz="1013" dirty="0" err="1"/>
+              <a:t>cells</a:t>
+            </a:r>
+            <a:endParaRPr lang="en-GB" sz="1013" dirty="0"/>
+          </a:p>
+        </p:txBody>
+      </p:sp>
+    </p:spTree>
+    <p:extLst>
+      <p:ext uri="{BB962C8B-B14F-4D97-AF65-F5344CB8AC3E}">
+        <p14:creationId xmlns:p14="http://schemas.microsoft.com/office/powerpoint/2010/main" val="314296002"/>
+      </p:ext>
+    </p:extLst>
+  </p:cSld>
+  <p:clrMapOvr>
+    <a:masterClrMapping/>
+  </p:clrMapOvr>
+</p:sld>
+</file>
+
 <file path=ppt/theme/theme1.xml><?xml version="1.0" encoding="utf-8"?>
 <a:theme xmlns:a="http://schemas.openxmlformats.org/drawingml/2006/main" name="Thème Office">
   <a:themeElements>

</xml_diff>